<commit_message>
revised .ppt for matplotlib wk5.1
</commit_message>
<xml_diff>
--- a/Power Points/matplotlibWk5.1.pptx
+++ b/Power Points/matplotlibWk5.1.pptx
@@ -236,7 +236,7 @@
           <a:p>
             <a:fld id="{51A969EA-8566-418D-AC96-BC5F6E9FAB6C}" type="datetimeFigureOut">
               <a:rPr lang="en-US" smtClean="0"/>
-              <a:t>12/7/18</a:t>
+              <a:t>12/8/18</a:t>
             </a:fld>
             <a:endParaRPr lang="en-US"/>
           </a:p>
@@ -401,7 +401,7 @@
           <a:p>
             <a:fld id="{33B07B4B-74D8-4C42-A719-1F93879497F8}" type="datetimeFigureOut">
               <a:rPr lang="en-US" smtClean="0"/>
-              <a:t>12/7/18</a:t>
+              <a:t>12/8/18</a:t>
             </a:fld>
             <a:endParaRPr lang="en-US"/>
           </a:p>
@@ -2296,7 +2296,7 @@
           <a:p>
             <a:fld id="{B65C9255-9F07-4181-9AD2-897FFC0A3B7E}" type="datetimeFigureOut">
               <a:rPr lang="en-US" smtClean="0"/>
-              <a:t>12/7/18</a:t>
+              <a:t>12/8/18</a:t>
             </a:fld>
             <a:endParaRPr lang="en-US"/>
           </a:p>
@@ -2498,7 +2498,7 @@
           <a:p>
             <a:fld id="{B65C9255-9F07-4181-9AD2-897FFC0A3B7E}" type="datetimeFigureOut">
               <a:rPr lang="en-US" smtClean="0"/>
-              <a:t>12/7/18</a:t>
+              <a:t>12/8/18</a:t>
             </a:fld>
             <a:endParaRPr lang="en-US"/>
           </a:p>
@@ -2721,7 +2721,7 @@
           <a:p>
             <a:fld id="{B65C9255-9F07-4181-9AD2-897FFC0A3B7E}" type="datetimeFigureOut">
               <a:rPr lang="en-US" smtClean="0"/>
-              <a:t>12/7/18</a:t>
+              <a:t>12/8/18</a:t>
             </a:fld>
             <a:endParaRPr lang="en-US"/>
           </a:p>
@@ -3794,7 +3794,7 @@
             </a:pPr>
             <a:r>
               <a:rPr lang="en-US" sz="2400"/>
-              <a:t>Able to create line; bar; scatter; and pie charts and change the appearance of out plots</a:t>
+              <a:t>Able to create line; bar; scatter; and pie charts and change the appearance of our plots</a:t>
             </a:r>
           </a:p>
           <a:p>

</xml_diff>